<commit_message>
Figure creation and code
The temp maps, and spectrum they were created off of, as well as the Temp to Grayscale image code.
</commit_message>
<xml_diff>
--- a/ConvNet/Figures/WACV Figure creation.pptx
+++ b/ConvNet/Figures/WACV Figure creation.pptx
@@ -5,15 +5,17 @@
     <p:sldMasterId id="2147483660" r:id="rId1"/>
   </p:sldMasterIdLst>
   <p:notesMasterIdLst>
-    <p:notesMasterId r:id="rId8"/>
+    <p:notesMasterId r:id="rId10"/>
   </p:notesMasterIdLst>
   <p:sldIdLst>
     <p:sldId id="256" r:id="rId2"/>
-    <p:sldId id="260" r:id="rId3"/>
-    <p:sldId id="258" r:id="rId4"/>
-    <p:sldId id="259" r:id="rId5"/>
-    <p:sldId id="261" r:id="rId6"/>
-    <p:sldId id="262" r:id="rId7"/>
+    <p:sldId id="263" r:id="rId3"/>
+    <p:sldId id="264" r:id="rId4"/>
+    <p:sldId id="260" r:id="rId5"/>
+    <p:sldId id="258" r:id="rId6"/>
+    <p:sldId id="259" r:id="rId7"/>
+    <p:sldId id="261" r:id="rId8"/>
+    <p:sldId id="262" r:id="rId9"/>
   </p:sldIdLst>
   <p:sldSz cx="9144000" cy="6858000" type="screen4x3"/>
   <p:notesSz cx="6858000" cy="9144000"/>
@@ -202,7 +204,7 @@
           <a:p>
             <a:fld id="{EEE2B1D8-2076-470B-AF59-3F2B1E1CB244}" type="datetimeFigureOut">
               <a:rPr lang="en-US" smtClean="0"/>
-              <a:t>5/28/2019</a:t>
+              <a:t>6/11/2019</a:t>
             </a:fld>
             <a:endParaRPr lang="en-US"/>
           </a:p>
@@ -544,7 +546,7 @@
           <a:p>
             <a:fld id="{281F4405-4C19-4544-B3FF-7B4088798BCC}" type="slidenum">
               <a:rPr lang="en-US" smtClean="0"/>
-              <a:t>3</a:t>
+              <a:t>5</a:t>
             </a:fld>
             <a:endParaRPr lang="en-US" dirty="0"/>
           </a:p>
@@ -694,7 +696,7 @@
           <a:p>
             <a:fld id="{C221F239-25D2-4E00-A675-01945B9329A5}" type="datetimeFigureOut">
               <a:rPr lang="en-US" smtClean="0"/>
-              <a:t>5/28/2019</a:t>
+              <a:t>6/11/2019</a:t>
             </a:fld>
             <a:endParaRPr lang="en-US"/>
           </a:p>
@@ -864,7 +866,7 @@
           <a:p>
             <a:fld id="{C221F239-25D2-4E00-A675-01945B9329A5}" type="datetimeFigureOut">
               <a:rPr lang="en-US" smtClean="0"/>
-              <a:t>5/28/2019</a:t>
+              <a:t>6/11/2019</a:t>
             </a:fld>
             <a:endParaRPr lang="en-US"/>
           </a:p>
@@ -1044,7 +1046,7 @@
           <a:p>
             <a:fld id="{C221F239-25D2-4E00-A675-01945B9329A5}" type="datetimeFigureOut">
               <a:rPr lang="en-US" smtClean="0"/>
-              <a:t>5/28/2019</a:t>
+              <a:t>6/11/2019</a:t>
             </a:fld>
             <a:endParaRPr lang="en-US"/>
           </a:p>
@@ -1214,7 +1216,7 @@
           <a:p>
             <a:fld id="{C221F239-25D2-4E00-A675-01945B9329A5}" type="datetimeFigureOut">
               <a:rPr lang="en-US" smtClean="0"/>
-              <a:t>5/28/2019</a:t>
+              <a:t>6/11/2019</a:t>
             </a:fld>
             <a:endParaRPr lang="en-US"/>
           </a:p>
@@ -1458,7 +1460,7 @@
           <a:p>
             <a:fld id="{C221F239-25D2-4E00-A675-01945B9329A5}" type="datetimeFigureOut">
               <a:rPr lang="en-US" smtClean="0"/>
-              <a:t>5/28/2019</a:t>
+              <a:t>6/11/2019</a:t>
             </a:fld>
             <a:endParaRPr lang="en-US"/>
           </a:p>
@@ -1690,7 +1692,7 @@
           <a:p>
             <a:fld id="{C221F239-25D2-4E00-A675-01945B9329A5}" type="datetimeFigureOut">
               <a:rPr lang="en-US" smtClean="0"/>
-              <a:t>5/28/2019</a:t>
+              <a:t>6/11/2019</a:t>
             </a:fld>
             <a:endParaRPr lang="en-US"/>
           </a:p>
@@ -2057,7 +2059,7 @@
           <a:p>
             <a:fld id="{C221F239-25D2-4E00-A675-01945B9329A5}" type="datetimeFigureOut">
               <a:rPr lang="en-US" smtClean="0"/>
-              <a:t>5/28/2019</a:t>
+              <a:t>6/11/2019</a:t>
             </a:fld>
             <a:endParaRPr lang="en-US"/>
           </a:p>
@@ -2175,7 +2177,7 @@
           <a:p>
             <a:fld id="{C221F239-25D2-4E00-A675-01945B9329A5}" type="datetimeFigureOut">
               <a:rPr lang="en-US" smtClean="0"/>
-              <a:t>5/28/2019</a:t>
+              <a:t>6/11/2019</a:t>
             </a:fld>
             <a:endParaRPr lang="en-US"/>
           </a:p>
@@ -2270,7 +2272,7 @@
           <a:p>
             <a:fld id="{C221F239-25D2-4E00-A675-01945B9329A5}" type="datetimeFigureOut">
               <a:rPr lang="en-US" smtClean="0"/>
-              <a:t>5/28/2019</a:t>
+              <a:t>6/11/2019</a:t>
             </a:fld>
             <a:endParaRPr lang="en-US"/>
           </a:p>
@@ -2547,7 +2549,7 @@
           <a:p>
             <a:fld id="{C221F239-25D2-4E00-A675-01945B9329A5}" type="datetimeFigureOut">
               <a:rPr lang="en-US" smtClean="0"/>
-              <a:t>5/28/2019</a:t>
+              <a:t>6/11/2019</a:t>
             </a:fld>
             <a:endParaRPr lang="en-US"/>
           </a:p>
@@ -2804,7 +2806,7 @@
           <a:p>
             <a:fld id="{C221F239-25D2-4E00-A675-01945B9329A5}" type="datetimeFigureOut">
               <a:rPr lang="en-US" smtClean="0"/>
-              <a:t>5/28/2019</a:t>
+              <a:t>6/11/2019</a:t>
             </a:fld>
             <a:endParaRPr lang="en-US"/>
           </a:p>
@@ -3017,7 +3019,7 @@
           <a:p>
             <a:fld id="{C221F239-25D2-4E00-A675-01945B9329A5}" type="datetimeFigureOut">
               <a:rPr lang="en-US" smtClean="0"/>
-              <a:t>5/28/2019</a:t>
+              <a:t>6/11/2019</a:t>
             </a:fld>
             <a:endParaRPr lang="en-US"/>
           </a:p>
@@ -4236,24 +4238,681 @@
           <a:chExt cx="0" cy="0"/>
         </a:xfrm>
       </p:grpSpPr>
+      <p:grpSp>
+        <p:nvGrpSpPr>
+          <p:cNvPr id="16" name="Group 15"/>
+          <p:cNvGrpSpPr/>
+          <p:nvPr/>
+        </p:nvGrpSpPr>
+        <p:grpSpPr>
+          <a:xfrm>
+            <a:off x="-21822237" y="-6404198"/>
+            <a:ext cx="30966237" cy="19988981"/>
+            <a:chOff x="-21822237" y="-6404198"/>
+            <a:chExt cx="30966237" cy="19988981"/>
+          </a:xfrm>
+        </p:grpSpPr>
+        <p:pic>
+          <p:nvPicPr>
+            <p:cNvPr id="5" name="Picture 4"/>
+            <p:cNvPicPr>
+              <a:picLocks noChangeAspect="1"/>
+            </p:cNvPicPr>
+            <p:nvPr/>
+          </p:nvPicPr>
+          <p:blipFill>
+            <a:blip r:embed="rId2"/>
+            <a:stretch>
+              <a:fillRect/>
+            </a:stretch>
+          </p:blipFill>
+          <p:spPr>
+            <a:xfrm>
+              <a:off x="-4732614" y="5834182"/>
+              <a:ext cx="13876614" cy="7750601"/>
+            </a:xfrm>
+            <a:prstGeom prst="rect">
+              <a:avLst/>
+            </a:prstGeom>
+          </p:spPr>
+        </p:pic>
+        <p:pic>
+          <p:nvPicPr>
+            <p:cNvPr id="6" name="Picture 5"/>
+            <p:cNvPicPr>
+              <a:picLocks noChangeAspect="1"/>
+            </p:cNvPicPr>
+            <p:nvPr/>
+          </p:nvPicPr>
+          <p:blipFill>
+            <a:blip r:embed="rId3"/>
+            <a:stretch>
+              <a:fillRect/>
+            </a:stretch>
+          </p:blipFill>
+          <p:spPr>
+            <a:xfrm>
+              <a:off x="-8857303" y="2485830"/>
+              <a:ext cx="13876614" cy="7750601"/>
+            </a:xfrm>
+            <a:prstGeom prst="rect">
+              <a:avLst/>
+            </a:prstGeom>
+          </p:spPr>
+        </p:pic>
+        <p:pic>
+          <p:nvPicPr>
+            <p:cNvPr id="7" name="Picture 6"/>
+            <p:cNvPicPr>
+              <a:picLocks noChangeAspect="1"/>
+            </p:cNvPicPr>
+            <p:nvPr/>
+          </p:nvPicPr>
+          <p:blipFill>
+            <a:blip r:embed="rId4"/>
+            <a:stretch>
+              <a:fillRect/>
+            </a:stretch>
+          </p:blipFill>
+          <p:spPr>
+            <a:xfrm>
+              <a:off x="-12981992" y="-477513"/>
+              <a:ext cx="13876614" cy="7750601"/>
+            </a:xfrm>
+            <a:prstGeom prst="rect">
+              <a:avLst/>
+            </a:prstGeom>
+          </p:spPr>
+        </p:pic>
+        <p:pic>
+          <p:nvPicPr>
+            <p:cNvPr id="8" name="Picture 7"/>
+            <p:cNvPicPr>
+              <a:picLocks noChangeAspect="1"/>
+            </p:cNvPicPr>
+            <p:nvPr/>
+          </p:nvPicPr>
+          <p:blipFill>
+            <a:blip r:embed="rId5"/>
+            <a:stretch>
+              <a:fillRect/>
+            </a:stretch>
+          </p:blipFill>
+          <p:spPr>
+            <a:xfrm>
+              <a:off x="-17106681" y="-3440856"/>
+              <a:ext cx="13876614" cy="7750601"/>
+            </a:xfrm>
+            <a:prstGeom prst="rect">
+              <a:avLst/>
+            </a:prstGeom>
+          </p:spPr>
+        </p:pic>
+        <p:pic>
+          <p:nvPicPr>
+            <p:cNvPr id="9" name="Picture 8"/>
+            <p:cNvPicPr>
+              <a:picLocks noChangeAspect="1"/>
+            </p:cNvPicPr>
+            <p:nvPr/>
+          </p:nvPicPr>
+          <p:blipFill>
+            <a:blip r:embed="rId6"/>
+            <a:stretch>
+              <a:fillRect/>
+            </a:stretch>
+          </p:blipFill>
+          <p:spPr>
+            <a:xfrm>
+              <a:off x="-21231370" y="-6404198"/>
+              <a:ext cx="13876614" cy="7750601"/>
+            </a:xfrm>
+            <a:prstGeom prst="rect">
+              <a:avLst/>
+            </a:prstGeom>
+          </p:spPr>
+        </p:pic>
+        <p:sp>
+          <p:nvSpPr>
+            <p:cNvPr id="11" name="TextBox 10"/>
+            <p:cNvSpPr txBox="1"/>
+            <p:nvPr/>
+          </p:nvSpPr>
+          <p:spPr>
+            <a:xfrm>
+              <a:off x="-21822237" y="-2239879"/>
+              <a:ext cx="1181734" cy="2215991"/>
+            </a:xfrm>
+            <a:prstGeom prst="rect">
+              <a:avLst/>
+            </a:prstGeom>
+            <a:noFill/>
+          </p:spPr>
+          <p:txBody>
+            <a:bodyPr wrap="none" rtlCol="0">
+              <a:spAutoFit/>
+            </a:bodyPr>
+            <a:lstStyle/>
+            <a:p>
+              <a:r>
+                <a:rPr lang="en-US" sz="13800" b="1" dirty="0" smtClean="0"/>
+                <a:t>R</a:t>
+              </a:r>
+              <a:endParaRPr lang="en-US" sz="13800" b="1" dirty="0"/>
+            </a:p>
+          </p:txBody>
+        </p:sp>
+        <p:sp>
+          <p:nvSpPr>
+            <p:cNvPr id="12" name="TextBox 11"/>
+            <p:cNvSpPr txBox="1"/>
+            <p:nvPr/>
+          </p:nvSpPr>
+          <p:spPr>
+            <a:xfrm>
+              <a:off x="-18089858" y="961394"/>
+              <a:ext cx="1382110" cy="2215991"/>
+            </a:xfrm>
+            <a:prstGeom prst="rect">
+              <a:avLst/>
+            </a:prstGeom>
+            <a:noFill/>
+          </p:spPr>
+          <p:txBody>
+            <a:bodyPr wrap="none" rtlCol="0">
+              <a:spAutoFit/>
+            </a:bodyPr>
+            <a:lstStyle/>
+            <a:p>
+              <a:r>
+                <a:rPr lang="en-US" sz="13800" b="1" dirty="0" smtClean="0"/>
+                <a:t>O</a:t>
+              </a:r>
+              <a:endParaRPr lang="en-US" sz="13800" b="1" dirty="0"/>
+            </a:p>
+          </p:txBody>
+        </p:sp>
+        <p:sp>
+          <p:nvSpPr>
+            <p:cNvPr id="13" name="TextBox 12"/>
+            <p:cNvSpPr txBox="1"/>
+            <p:nvPr/>
+          </p:nvSpPr>
+          <p:spPr>
+            <a:xfrm>
+              <a:off x="-13766613" y="3905378"/>
+              <a:ext cx="1104790" cy="2215991"/>
+            </a:xfrm>
+            <a:prstGeom prst="rect">
+              <a:avLst/>
+            </a:prstGeom>
+            <a:noFill/>
+          </p:spPr>
+          <p:txBody>
+            <a:bodyPr wrap="none" rtlCol="0">
+              <a:spAutoFit/>
+            </a:bodyPr>
+            <a:lstStyle/>
+            <a:p>
+              <a:r>
+                <a:rPr lang="en-US" sz="13800" b="1" dirty="0"/>
+                <a:t>Y</a:t>
+              </a:r>
+              <a:endParaRPr lang="en-US" sz="13800" b="1" dirty="0"/>
+            </a:p>
+          </p:txBody>
+        </p:sp>
+        <p:sp>
+          <p:nvSpPr>
+            <p:cNvPr id="14" name="TextBox 13"/>
+            <p:cNvSpPr txBox="1"/>
+            <p:nvPr/>
+          </p:nvSpPr>
+          <p:spPr>
+            <a:xfrm>
+              <a:off x="-10039037" y="6731272"/>
+              <a:ext cx="1311578" cy="2215991"/>
+            </a:xfrm>
+            <a:prstGeom prst="rect">
+              <a:avLst/>
+            </a:prstGeom>
+            <a:noFill/>
+          </p:spPr>
+          <p:txBody>
+            <a:bodyPr wrap="none" rtlCol="0">
+              <a:spAutoFit/>
+            </a:bodyPr>
+            <a:lstStyle/>
+            <a:p>
+              <a:r>
+                <a:rPr lang="en-US" sz="13800" b="1" dirty="0"/>
+                <a:t>G</a:t>
+              </a:r>
+              <a:endParaRPr lang="en-US" sz="13800" b="1" dirty="0"/>
+            </a:p>
+          </p:txBody>
+        </p:sp>
+        <p:sp>
+          <p:nvSpPr>
+            <p:cNvPr id="15" name="TextBox 14"/>
+            <p:cNvSpPr txBox="1"/>
+            <p:nvPr/>
+          </p:nvSpPr>
+          <p:spPr>
+            <a:xfrm>
+              <a:off x="-6043685" y="9709482"/>
+              <a:ext cx="1176925" cy="2215991"/>
+            </a:xfrm>
+            <a:prstGeom prst="rect">
+              <a:avLst/>
+            </a:prstGeom>
+            <a:noFill/>
+          </p:spPr>
+          <p:txBody>
+            <a:bodyPr wrap="none" rtlCol="0">
+              <a:spAutoFit/>
+            </a:bodyPr>
+            <a:lstStyle/>
+            <a:p>
+              <a:r>
+                <a:rPr lang="en-US" sz="13800" b="1" dirty="0" smtClean="0"/>
+                <a:t>B</a:t>
+              </a:r>
+              <a:endParaRPr lang="en-US" sz="13800" b="1" dirty="0"/>
+            </a:p>
+          </p:txBody>
+        </p:sp>
+      </p:grpSp>
       <p:pic>
         <p:nvPicPr>
-          <p:cNvPr id="4" name="Picture 3"/>
+          <p:cNvPr id="17" name="Picture 16"/>
+          <p:cNvPicPr>
+            <a:picLocks noChangeAspect="1"/>
+          </p:cNvPicPr>
+          <p:nvPr/>
+        </p:nvPicPr>
+        <p:blipFill rotWithShape="1">
+          <a:blip r:embed="rId7"/>
+          <a:srcRect l="12037" t="3860" b="6015"/>
+          <a:stretch/>
+        </p:blipFill>
+        <p:spPr>
+          <a:xfrm>
+            <a:off x="2205693" y="-6600935"/>
+            <a:ext cx="14050627" cy="7700210"/>
+          </a:xfrm>
+          <a:prstGeom prst="rect">
+            <a:avLst/>
+          </a:prstGeom>
+        </p:spPr>
+      </p:pic>
+      <p:pic>
+        <p:nvPicPr>
+          <p:cNvPr id="18" name="Picture 17"/>
+          <p:cNvPicPr>
+            <a:picLocks noChangeAspect="1"/>
+          </p:cNvPicPr>
+          <p:nvPr/>
+        </p:nvPicPr>
+        <p:blipFill rotWithShape="1">
+          <a:blip r:embed="rId8"/>
+          <a:srcRect l="9315" t="4137" b="6371"/>
+          <a:stretch/>
+        </p:blipFill>
+        <p:spPr>
+          <a:xfrm>
+            <a:off x="26319916" y="3290075"/>
+            <a:ext cx="14929513" cy="7365592"/>
+          </a:xfrm>
+          <a:prstGeom prst="rect">
+            <a:avLst/>
+          </a:prstGeom>
+        </p:spPr>
+      </p:pic>
+    </p:spTree>
+    <p:extLst>
+      <p:ext uri="{BB962C8B-B14F-4D97-AF65-F5344CB8AC3E}">
+        <p14:creationId xmlns:p14="http://schemas.microsoft.com/office/powerpoint/2010/main" val="1496857523"/>
+      </p:ext>
+    </p:extLst>
+  </p:cSld>
+  <p:clrMapOvr>
+    <a:masterClrMapping/>
+  </p:clrMapOvr>
+</p:sld>
+</file>
+
+<file path=ppt/slides/slide3.xml><?xml version="1.0" encoding="utf-8"?>
+<p:sld xmlns:a="http://schemas.openxmlformats.org/drawingml/2006/main" xmlns:r="http://schemas.openxmlformats.org/officeDocument/2006/relationships" xmlns:p="http://schemas.openxmlformats.org/presentationml/2006/main">
+  <p:cSld>
+    <p:spTree>
+      <p:nvGrpSpPr>
+        <p:cNvPr id="1" name=""/>
+        <p:cNvGrpSpPr/>
+        <p:nvPr/>
+      </p:nvGrpSpPr>
+      <p:grpSpPr>
+        <a:xfrm>
+          <a:off x="0" y="0"/>
+          <a:ext cx="0" cy="0"/>
+          <a:chOff x="0" y="0"/>
+          <a:chExt cx="0" cy="0"/>
+        </a:xfrm>
+      </p:grpSpPr>
+      <p:grpSp>
+        <p:nvGrpSpPr>
+          <p:cNvPr id="10" name="Group 9"/>
+          <p:cNvGrpSpPr/>
+          <p:nvPr/>
+        </p:nvGrpSpPr>
+        <p:grpSpPr>
+          <a:xfrm>
+            <a:off x="-588005" y="-284569"/>
+            <a:ext cx="10540286" cy="7802276"/>
+            <a:chOff x="-588005" y="-284569"/>
+            <a:chExt cx="10540286" cy="7802276"/>
+          </a:xfrm>
+        </p:grpSpPr>
+        <p:pic>
+          <p:nvPicPr>
+            <p:cNvPr id="2" name="Picture 1"/>
+            <p:cNvPicPr>
+              <a:picLocks noChangeAspect="1"/>
+            </p:cNvPicPr>
+            <p:nvPr/>
+          </p:nvPicPr>
+          <p:blipFill>
+            <a:blip r:embed="rId2"/>
+            <a:stretch>
+              <a:fillRect/>
+            </a:stretch>
+          </p:blipFill>
+          <p:spPr>
+            <a:xfrm>
+              <a:off x="-585543" y="-284569"/>
+              <a:ext cx="5344500" cy="4004000"/>
+            </a:xfrm>
+            <a:prstGeom prst="rect">
+              <a:avLst/>
+            </a:prstGeom>
+          </p:spPr>
+        </p:pic>
+        <p:pic>
+          <p:nvPicPr>
+            <p:cNvPr id="3" name="Picture 2"/>
+            <p:cNvPicPr>
+              <a:picLocks noChangeAspect="1"/>
+            </p:cNvPicPr>
+            <p:nvPr/>
+          </p:nvPicPr>
+          <p:blipFill>
+            <a:blip r:embed="rId3"/>
+            <a:stretch>
+              <a:fillRect/>
+            </a:stretch>
+          </p:blipFill>
+          <p:spPr>
+            <a:xfrm>
+              <a:off x="-585543" y="3513707"/>
+              <a:ext cx="5344500" cy="4004000"/>
+            </a:xfrm>
+            <a:prstGeom prst="rect">
+              <a:avLst/>
+            </a:prstGeom>
+          </p:spPr>
+        </p:pic>
+        <p:pic>
+          <p:nvPicPr>
+            <p:cNvPr id="4" name="Picture 3"/>
+            <p:cNvPicPr>
+              <a:picLocks noChangeAspect="1"/>
+            </p:cNvPicPr>
+            <p:nvPr/>
+          </p:nvPicPr>
+          <p:blipFill>
+            <a:blip r:embed="rId4"/>
+            <a:stretch>
+              <a:fillRect/>
+            </a:stretch>
+          </p:blipFill>
+          <p:spPr>
+            <a:xfrm>
+              <a:off x="4607781" y="-284569"/>
+              <a:ext cx="5344500" cy="4004000"/>
+            </a:xfrm>
+            <a:prstGeom prst="rect">
+              <a:avLst/>
+            </a:prstGeom>
+          </p:spPr>
+        </p:pic>
+        <p:pic>
+          <p:nvPicPr>
+            <p:cNvPr id="5" name="Picture 4"/>
+            <p:cNvPicPr>
+              <a:picLocks noChangeAspect="1"/>
+            </p:cNvPicPr>
+            <p:nvPr/>
+          </p:nvPicPr>
+          <p:blipFill>
+            <a:blip r:embed="rId5"/>
+            <a:stretch>
+              <a:fillRect/>
+            </a:stretch>
+          </p:blipFill>
+          <p:spPr>
+            <a:xfrm>
+              <a:off x="4607781" y="3513707"/>
+              <a:ext cx="5344500" cy="4004000"/>
+            </a:xfrm>
+            <a:prstGeom prst="rect">
+              <a:avLst/>
+            </a:prstGeom>
+          </p:spPr>
+        </p:pic>
+        <p:sp>
+          <p:nvSpPr>
+            <p:cNvPr id="6" name="TextBox 5"/>
+            <p:cNvSpPr txBox="1"/>
+            <p:nvPr/>
+          </p:nvSpPr>
+          <p:spPr>
+            <a:xfrm>
+              <a:off x="-585543" y="-128954"/>
+              <a:ext cx="556563" cy="646331"/>
+            </a:xfrm>
+            <a:prstGeom prst="rect">
+              <a:avLst/>
+            </a:prstGeom>
+            <a:noFill/>
+          </p:spPr>
+          <p:txBody>
+            <a:bodyPr wrap="none" rtlCol="0">
+              <a:spAutoFit/>
+            </a:bodyPr>
+            <a:lstStyle/>
+            <a:p>
+              <a:r>
+                <a:rPr lang="en-US" sz="3600" b="1" dirty="0" smtClean="0"/>
+                <a:t>a)</a:t>
+              </a:r>
+              <a:endParaRPr lang="en-US" sz="3600" b="1" dirty="0"/>
+            </a:p>
+          </p:txBody>
+        </p:sp>
+        <p:sp>
+          <p:nvSpPr>
+            <p:cNvPr id="7" name="TextBox 6"/>
+            <p:cNvSpPr txBox="1"/>
+            <p:nvPr/>
+          </p:nvSpPr>
+          <p:spPr>
+            <a:xfrm>
+              <a:off x="-588005" y="3719431"/>
+              <a:ext cx="522900" cy="646331"/>
+            </a:xfrm>
+            <a:prstGeom prst="rect">
+              <a:avLst/>
+            </a:prstGeom>
+            <a:noFill/>
+          </p:spPr>
+          <p:txBody>
+            <a:bodyPr wrap="none" rtlCol="0">
+              <a:spAutoFit/>
+            </a:bodyPr>
+            <a:lstStyle/>
+            <a:p>
+              <a:r>
+                <a:rPr lang="en-US" sz="3600" b="1" dirty="0"/>
+                <a:t>c</a:t>
+              </a:r>
+              <a:r>
+                <a:rPr lang="en-US" sz="3600" b="1" dirty="0" smtClean="0"/>
+                <a:t>)</a:t>
+              </a:r>
+              <a:endParaRPr lang="en-US" sz="3600" b="1" dirty="0"/>
+            </a:p>
+          </p:txBody>
+        </p:sp>
+        <p:sp>
+          <p:nvSpPr>
+            <p:cNvPr id="8" name="TextBox 7"/>
+            <p:cNvSpPr txBox="1"/>
+            <p:nvPr/>
+          </p:nvSpPr>
+          <p:spPr>
+            <a:xfrm>
+              <a:off x="4640140" y="-128954"/>
+              <a:ext cx="577402" cy="646331"/>
+            </a:xfrm>
+            <a:prstGeom prst="rect">
+              <a:avLst/>
+            </a:prstGeom>
+            <a:noFill/>
+          </p:spPr>
+          <p:txBody>
+            <a:bodyPr wrap="none" rtlCol="0">
+              <a:spAutoFit/>
+            </a:bodyPr>
+            <a:lstStyle/>
+            <a:p>
+              <a:r>
+                <a:rPr lang="en-US" sz="3600" b="1" dirty="0"/>
+                <a:t>b</a:t>
+              </a:r>
+              <a:r>
+                <a:rPr lang="en-US" sz="3600" b="1" dirty="0" smtClean="0"/>
+                <a:t>)</a:t>
+              </a:r>
+              <a:endParaRPr lang="en-US" sz="3600" b="1" dirty="0"/>
+            </a:p>
+          </p:txBody>
+        </p:sp>
+        <p:sp>
+          <p:nvSpPr>
+            <p:cNvPr id="9" name="TextBox 8"/>
+            <p:cNvSpPr txBox="1"/>
+            <p:nvPr/>
+          </p:nvSpPr>
+          <p:spPr>
+            <a:xfrm>
+              <a:off x="4640140" y="3719430"/>
+              <a:ext cx="577402" cy="646331"/>
+            </a:xfrm>
+            <a:prstGeom prst="rect">
+              <a:avLst/>
+            </a:prstGeom>
+            <a:noFill/>
+          </p:spPr>
+          <p:txBody>
+            <a:bodyPr wrap="none" rtlCol="0">
+              <a:spAutoFit/>
+            </a:bodyPr>
+            <a:lstStyle/>
+            <a:p>
+              <a:r>
+                <a:rPr lang="en-US" sz="3600" b="1" dirty="0"/>
+                <a:t>d</a:t>
+              </a:r>
+              <a:r>
+                <a:rPr lang="en-US" sz="3600" b="1" dirty="0" smtClean="0"/>
+                <a:t>)</a:t>
+              </a:r>
+              <a:endParaRPr lang="en-US" sz="3600" b="1" dirty="0"/>
+            </a:p>
+          </p:txBody>
+        </p:sp>
+      </p:grpSp>
+      <p:pic>
+        <p:nvPicPr>
+          <p:cNvPr id="11" name="Picture 10"/>
           <p:cNvPicPr>
             <a:picLocks noChangeAspect="1"/>
           </p:cNvPicPr>
           <p:nvPr/>
         </p:nvPicPr>
         <p:blipFill>
-          <a:blip r:embed="rId2"/>
+          <a:blip r:embed="rId6"/>
           <a:stretch>
             <a:fillRect/>
           </a:stretch>
         </p:blipFill>
         <p:spPr>
           <a:xfrm>
-            <a:off x="4651496" y="922798"/>
-            <a:ext cx="5344500" cy="4004000"/>
+            <a:off x="-575043" y="-4207261"/>
+            <a:ext cx="5334000" cy="4000500"/>
+          </a:xfrm>
+          <a:prstGeom prst="rect">
+            <a:avLst/>
+          </a:prstGeom>
+        </p:spPr>
+      </p:pic>
+    </p:spTree>
+    <p:extLst>
+      <p:ext uri="{BB962C8B-B14F-4D97-AF65-F5344CB8AC3E}">
+        <p14:creationId xmlns:p14="http://schemas.microsoft.com/office/powerpoint/2010/main" val="1554766484"/>
+      </p:ext>
+    </p:extLst>
+  </p:cSld>
+  <p:clrMapOvr>
+    <a:masterClrMapping/>
+  </p:clrMapOvr>
+</p:sld>
+</file>
+
+<file path=ppt/slides/slide4.xml><?xml version="1.0" encoding="utf-8"?>
+<p:sld xmlns:a="http://schemas.openxmlformats.org/drawingml/2006/main" xmlns:r="http://schemas.openxmlformats.org/officeDocument/2006/relationships" xmlns:p="http://schemas.openxmlformats.org/presentationml/2006/main">
+  <p:cSld>
+    <p:spTree>
+      <p:nvGrpSpPr>
+        <p:cNvPr id="1" name=""/>
+        <p:cNvGrpSpPr/>
+        <p:nvPr/>
+      </p:nvGrpSpPr>
+      <p:grpSpPr>
+        <a:xfrm>
+          <a:off x="0" y="0"/>
+          <a:ext cx="0" cy="0"/>
+          <a:chOff x="0" y="0"/>
+          <a:chExt cx="0" cy="0"/>
+        </a:xfrm>
+      </p:grpSpPr>
+      <p:pic>
+        <p:nvPicPr>
+          <p:cNvPr id="7" name="Picture 6"/>
+          <p:cNvPicPr>
+            <a:picLocks noChangeAspect="1"/>
+          </p:cNvPicPr>
+          <p:nvPr/>
+        </p:nvPicPr>
+        <p:blipFill rotWithShape="1">
+          <a:blip r:embed="rId2"/>
+          <a:srcRect l="3754"/>
+          <a:stretch/>
+        </p:blipFill>
+        <p:spPr>
+          <a:xfrm>
+            <a:off x="-2153868" y="-859109"/>
+            <a:ext cx="5143865" cy="4004000"/>
           </a:xfrm>
           <a:prstGeom prst="rect">
             <a:avLst/>
@@ -4262,7 +4921,7 @@
       </p:pic>
       <p:pic>
         <p:nvPicPr>
-          <p:cNvPr id="6" name="Picture 5"/>
+          <p:cNvPr id="8" name="Picture 7"/>
           <p:cNvPicPr>
             <a:picLocks noChangeAspect="1"/>
           </p:cNvPicPr>
@@ -4276,7 +4935,7 @@
         </p:blipFill>
         <p:spPr>
           <a:xfrm>
-            <a:off x="-467435" y="922798"/>
+            <a:off x="-2354503" y="7004539"/>
             <a:ext cx="5344500" cy="4004000"/>
           </a:xfrm>
           <a:prstGeom prst="rect">
@@ -4284,6 +4943,128 @@
           </a:prstGeom>
         </p:spPr>
       </p:pic>
+      <p:pic>
+        <p:nvPicPr>
+          <p:cNvPr id="9" name="Picture 8"/>
+          <p:cNvPicPr>
+            <a:picLocks noChangeAspect="1"/>
+          </p:cNvPicPr>
+          <p:nvPr/>
+        </p:nvPicPr>
+        <p:blipFill>
+          <a:blip r:embed="rId4"/>
+          <a:stretch>
+            <a:fillRect/>
+          </a:stretch>
+        </p:blipFill>
+        <p:spPr>
+          <a:xfrm>
+            <a:off x="-2354503" y="3000539"/>
+            <a:ext cx="5344500" cy="4004000"/>
+          </a:xfrm>
+          <a:prstGeom prst="rect">
+            <a:avLst/>
+          </a:prstGeom>
+        </p:spPr>
+      </p:pic>
+      <p:sp>
+        <p:nvSpPr>
+          <p:cNvPr id="10" name="TextBox 9"/>
+          <p:cNvSpPr txBox="1"/>
+          <p:nvPr/>
+        </p:nvSpPr>
+        <p:spPr>
+          <a:xfrm>
+            <a:off x="-2930116" y="-703481"/>
+            <a:ext cx="556563" cy="646331"/>
+          </a:xfrm>
+          <a:prstGeom prst="rect">
+            <a:avLst/>
+          </a:prstGeom>
+          <a:noFill/>
+        </p:spPr>
+        <p:txBody>
+          <a:bodyPr wrap="none" rtlCol="0">
+            <a:spAutoFit/>
+          </a:bodyPr>
+          <a:lstStyle/>
+          <a:p>
+            <a:r>
+              <a:rPr lang="en-US" sz="3600" b="1" dirty="0" smtClean="0"/>
+              <a:t>a)</a:t>
+            </a:r>
+            <a:endParaRPr lang="en-US" sz="3600" b="1" dirty="0"/>
+          </a:p>
+        </p:txBody>
+      </p:sp>
+      <p:sp>
+        <p:nvSpPr>
+          <p:cNvPr id="11" name="TextBox 10"/>
+          <p:cNvSpPr txBox="1"/>
+          <p:nvPr/>
+        </p:nvSpPr>
+        <p:spPr>
+          <a:xfrm>
+            <a:off x="-2934001" y="3201769"/>
+            <a:ext cx="577402" cy="646331"/>
+          </a:xfrm>
+          <a:prstGeom prst="rect">
+            <a:avLst/>
+          </a:prstGeom>
+          <a:noFill/>
+        </p:spPr>
+        <p:txBody>
+          <a:bodyPr wrap="none" rtlCol="0">
+            <a:spAutoFit/>
+          </a:bodyPr>
+          <a:lstStyle/>
+          <a:p>
+            <a:r>
+              <a:rPr lang="en-US" sz="3600" b="1" dirty="0"/>
+              <a:t>b</a:t>
+            </a:r>
+            <a:r>
+              <a:rPr lang="en-US" sz="3600" b="1" dirty="0" smtClean="0"/>
+              <a:t>)</a:t>
+            </a:r>
+            <a:endParaRPr lang="en-US" sz="3600" b="1" dirty="0"/>
+          </a:p>
+        </p:txBody>
+      </p:sp>
+      <p:sp>
+        <p:nvSpPr>
+          <p:cNvPr id="12" name="TextBox 11"/>
+          <p:cNvSpPr txBox="1"/>
+          <p:nvPr/>
+        </p:nvSpPr>
+        <p:spPr>
+          <a:xfrm>
+            <a:off x="-2934001" y="7088653"/>
+            <a:ext cx="522900" cy="646331"/>
+          </a:xfrm>
+          <a:prstGeom prst="rect">
+            <a:avLst/>
+          </a:prstGeom>
+          <a:noFill/>
+        </p:spPr>
+        <p:txBody>
+          <a:bodyPr wrap="none" rtlCol="0">
+            <a:spAutoFit/>
+          </a:bodyPr>
+          <a:lstStyle/>
+          <a:p>
+            <a:r>
+              <a:rPr lang="en-US" sz="3600" b="1" dirty="0"/>
+              <a:t>c</a:t>
+            </a:r>
+            <a:r>
+              <a:rPr lang="en-US" sz="3600" b="1" dirty="0" smtClean="0"/>
+              <a:t>)</a:t>
+            </a:r>
+            <a:endParaRPr lang="en-US" sz="3600" b="1" dirty="0"/>
+          </a:p>
+        </p:txBody>
+      </p:sp>
     </p:spTree>
     <p:extLst>
       <p:ext uri="{BB962C8B-B14F-4D97-AF65-F5344CB8AC3E}">
@@ -4297,7 +5078,7 @@
 </p:sld>
 </file>
 
-<file path=ppt/slides/slide3.xml><?xml version="1.0" encoding="utf-8"?>
+<file path=ppt/slides/slide5.xml><?xml version="1.0" encoding="utf-8"?>
 <p:sld xmlns:a="http://schemas.openxmlformats.org/drawingml/2006/main" xmlns:r="http://schemas.openxmlformats.org/officeDocument/2006/relationships" xmlns:p="http://schemas.openxmlformats.org/presentationml/2006/main">
   <p:cSld>
     <p:spTree>
@@ -5329,7 +6110,7 @@
 </p:sld>
 </file>
 
-<file path=ppt/slides/slide4.xml><?xml version="1.0" encoding="utf-8"?>
+<file path=ppt/slides/slide6.xml><?xml version="1.0" encoding="utf-8"?>
 <p:sld xmlns:a="http://schemas.openxmlformats.org/drawingml/2006/main" xmlns:r="http://schemas.openxmlformats.org/officeDocument/2006/relationships" xmlns:p="http://schemas.openxmlformats.org/presentationml/2006/main">
   <p:cSld>
     <p:spTree>
@@ -5967,7 +6748,7 @@
 </p:sld>
 </file>
 
-<file path=ppt/slides/slide5.xml><?xml version="1.0" encoding="utf-8"?>
+<file path=ppt/slides/slide7.xml><?xml version="1.0" encoding="utf-8"?>
 <p:sld xmlns:a="http://schemas.openxmlformats.org/drawingml/2006/main" xmlns:r="http://schemas.openxmlformats.org/officeDocument/2006/relationships" xmlns:p="http://schemas.openxmlformats.org/presentationml/2006/main">
   <p:cSld>
     <p:spTree>
@@ -6120,7 +6901,7 @@
 </p:sld>
 </file>
 
-<file path=ppt/slides/slide6.xml><?xml version="1.0" encoding="utf-8"?>
+<file path=ppt/slides/slide8.xml><?xml version="1.0" encoding="utf-8"?>
 <p:sld xmlns:a="http://schemas.openxmlformats.org/drawingml/2006/main" xmlns:r="http://schemas.openxmlformats.org/officeDocument/2006/relationships" xmlns:p="http://schemas.openxmlformats.org/presentationml/2006/main">
   <p:cSld>
     <p:spTree>

</xml_diff>